<commit_message>
i3dm renames: url, gltfByteLength, gltfFormat, batchTableByteLength
</commit_message>
<xml_diff>
--- a/TileFormats/Instanced3DModel/figures/Figures.pptx
+++ b/TileFormats/Instanced3DModel/figures/Figures.pptx
@@ -304,7 +304,7 @@
           <a:p>
             <a:fld id="{E44376AC-B3C2-8643-B9A3-A6905164CDF3}" type="datetimeFigureOut">
               <a:rPr lang="en-US" smtClean="0"/>
-              <a:t>11/5/2015</a:t>
+              <a:t>11/7/2015</a:t>
             </a:fld>
             <a:endParaRPr lang="en-US"/>
           </a:p>
@@ -474,7 +474,7 @@
           <a:p>
             <a:fld id="{E44376AC-B3C2-8643-B9A3-A6905164CDF3}" type="datetimeFigureOut">
               <a:rPr lang="en-US" smtClean="0"/>
-              <a:t>11/5/2015</a:t>
+              <a:t>11/7/2015</a:t>
             </a:fld>
             <a:endParaRPr lang="en-US"/>
           </a:p>
@@ -654,7 +654,7 @@
           <a:p>
             <a:fld id="{E44376AC-B3C2-8643-B9A3-A6905164CDF3}" type="datetimeFigureOut">
               <a:rPr lang="en-US" smtClean="0"/>
-              <a:t>11/5/2015</a:t>
+              <a:t>11/7/2015</a:t>
             </a:fld>
             <a:endParaRPr lang="en-US"/>
           </a:p>
@@ -824,7 +824,7 @@
           <a:p>
             <a:fld id="{E44376AC-B3C2-8643-B9A3-A6905164CDF3}" type="datetimeFigureOut">
               <a:rPr lang="en-US" smtClean="0"/>
-              <a:t>11/5/2015</a:t>
+              <a:t>11/7/2015</a:t>
             </a:fld>
             <a:endParaRPr lang="en-US"/>
           </a:p>
@@ -1070,7 +1070,7 @@
           <a:p>
             <a:fld id="{E44376AC-B3C2-8643-B9A3-A6905164CDF3}" type="datetimeFigureOut">
               <a:rPr lang="en-US" smtClean="0"/>
-              <a:t>11/5/2015</a:t>
+              <a:t>11/7/2015</a:t>
             </a:fld>
             <a:endParaRPr lang="en-US"/>
           </a:p>
@@ -1358,7 +1358,7 @@
           <a:p>
             <a:fld id="{E44376AC-B3C2-8643-B9A3-A6905164CDF3}" type="datetimeFigureOut">
               <a:rPr lang="en-US" smtClean="0"/>
-              <a:t>11/5/2015</a:t>
+              <a:t>11/7/2015</a:t>
             </a:fld>
             <a:endParaRPr lang="en-US"/>
           </a:p>
@@ -1780,7 +1780,7 @@
           <a:p>
             <a:fld id="{E44376AC-B3C2-8643-B9A3-A6905164CDF3}" type="datetimeFigureOut">
               <a:rPr lang="en-US" smtClean="0"/>
-              <a:t>11/5/2015</a:t>
+              <a:t>11/7/2015</a:t>
             </a:fld>
             <a:endParaRPr lang="en-US"/>
           </a:p>
@@ -1898,7 +1898,7 @@
           <a:p>
             <a:fld id="{E44376AC-B3C2-8643-B9A3-A6905164CDF3}" type="datetimeFigureOut">
               <a:rPr lang="en-US" smtClean="0"/>
-              <a:t>11/5/2015</a:t>
+              <a:t>11/7/2015</a:t>
             </a:fld>
             <a:endParaRPr lang="en-US"/>
           </a:p>
@@ -1993,7 +1993,7 @@
           <a:p>
             <a:fld id="{E44376AC-B3C2-8643-B9A3-A6905164CDF3}" type="datetimeFigureOut">
               <a:rPr lang="en-US" smtClean="0"/>
-              <a:t>11/5/2015</a:t>
+              <a:t>11/7/2015</a:t>
             </a:fld>
             <a:endParaRPr lang="en-US"/>
           </a:p>
@@ -2270,7 +2270,7 @@
           <a:p>
             <a:fld id="{E44376AC-B3C2-8643-B9A3-A6905164CDF3}" type="datetimeFigureOut">
               <a:rPr lang="en-US" smtClean="0"/>
-              <a:t>11/5/2015</a:t>
+              <a:t>11/7/2015</a:t>
             </a:fld>
             <a:endParaRPr lang="en-US"/>
           </a:p>
@@ -2523,7 +2523,7 @@
           <a:p>
             <a:fld id="{E44376AC-B3C2-8643-B9A3-A6905164CDF3}" type="datetimeFigureOut">
               <a:rPr lang="en-US" smtClean="0"/>
-              <a:t>11/5/2015</a:t>
+              <a:t>11/7/2015</a:t>
             </a:fld>
             <a:endParaRPr lang="en-US"/>
           </a:p>
@@ -2736,7 +2736,7 @@
           <a:p>
             <a:fld id="{E44376AC-B3C2-8643-B9A3-A6905164CDF3}" type="datetimeFigureOut">
               <a:rPr lang="en-US" smtClean="0"/>
-              <a:t>11/5/2015</a:t>
+              <a:t>11/7/2015</a:t>
             </a:fld>
             <a:endParaRPr lang="en-US"/>
           </a:p>
@@ -3113,14 +3113,14 @@
       </p:grpSpPr>
       <p:sp>
         <p:nvSpPr>
-          <p:cNvPr id="4" name="TextBox 3"/>
+          <p:cNvPr id="17" name="TextBox 16"/>
           <p:cNvSpPr txBox="1"/>
           <p:nvPr/>
         </p:nvSpPr>
         <p:spPr>
           <a:xfrm>
-            <a:off x="176306" y="662695"/>
-            <a:ext cx="1713931" cy="430887"/>
+            <a:off x="7561603" y="679644"/>
+            <a:ext cx="1386918" cy="415498"/>
           </a:xfrm>
           <a:prstGeom prst="rect">
             <a:avLst/>
@@ -3140,47 +3140,43 @@
           <a:p>
             <a:pPr algn="ctr"/>
             <a:r>
-              <a:rPr lang="en-US" sz="1100" dirty="0">
-                <a:latin typeface="Courier New"/>
-                <a:cs typeface="Courier New"/>
-              </a:rPr>
-              <a:t>m</a:t>
-            </a:r>
-            <a:r>
-              <a:rPr lang="en-US" sz="1100" dirty="0" smtClean="0">
-                <a:latin typeface="Courier New"/>
-                <a:cs typeface="Courier New"/>
-              </a:rPr>
-              <a:t>agic</a:t>
+              <a:rPr lang="en-US" sz="1000" dirty="0" smtClean="0">
+                <a:latin typeface="Courier New"/>
+                <a:cs typeface="Courier New"/>
+              </a:rPr>
+              <a:t>instancesLength</a:t>
             </a:r>
           </a:p>
           <a:p>
             <a:pPr algn="ctr"/>
             <a:r>
-              <a:rPr lang="en-US" sz="1100" dirty="0" smtClean="0">
+              <a:rPr lang="en-US" sz="1000" dirty="0" smtClean="0">
                 <a:latin typeface="Courier New"/>
                 <a:cs typeface="Courier New"/>
               </a:rPr>
               <a:t>(</a:t>
             </a:r>
             <a:r>
-              <a:rPr lang="en-US" sz="1100" dirty="0" smtClean="0">
+              <a:rPr lang="en-US" sz="1000" dirty="0" smtClean="0">
                 <a:solidFill>
-                  <a:srgbClr val="558ED5"/>
+                  <a:schemeClr val="tx2">
+                    <a:lumMod val="60000"/>
+                    <a:lumOff val="40000"/>
+                  </a:schemeClr>
                 </a:solidFill>
                 <a:latin typeface="Courier New"/>
                 <a:cs typeface="Courier New"/>
               </a:rPr>
-              <a:t>unsigned char</a:t>
-            </a:r>
-            <a:r>
-              <a:rPr lang="en-US" sz="1100" dirty="0" smtClean="0">
-                <a:latin typeface="Courier New"/>
-                <a:cs typeface="Courier New"/>
-              </a:rPr>
-              <a:t>[4])</a:t>
-            </a:r>
-            <a:endParaRPr lang="en-US" sz="1100" dirty="0">
+              <a:t>uint32</a:t>
+            </a:r>
+            <a:r>
+              <a:rPr lang="en-US" sz="1000" dirty="0" smtClean="0">
+                <a:latin typeface="Courier New"/>
+                <a:cs typeface="Courier New"/>
+              </a:rPr>
+              <a:t>)</a:t>
+            </a:r>
+            <a:endParaRPr lang="en-US" sz="1000" dirty="0">
               <a:latin typeface="Courier New"/>
               <a:cs typeface="Courier New"/>
             </a:endParaRPr>
@@ -3189,14 +3185,14 @@
       </p:sp>
       <p:sp>
         <p:nvSpPr>
-          <p:cNvPr id="5" name="TextBox 4"/>
+          <p:cNvPr id="4" name="TextBox 3"/>
           <p:cNvSpPr txBox="1"/>
           <p:nvPr/>
         </p:nvSpPr>
         <p:spPr>
           <a:xfrm>
-            <a:off x="1886005" y="662695"/>
-            <a:ext cx="864339" cy="430887"/>
+            <a:off x="43759" y="679644"/>
+            <a:ext cx="1627369" cy="415498"/>
           </a:xfrm>
           <a:prstGeom prst="rect">
             <a:avLst/>
@@ -3216,7 +3212,83 @@
           <a:p>
             <a:pPr algn="ctr"/>
             <a:r>
-              <a:rPr lang="en-US" sz="1100" dirty="0" smtClean="0">
+              <a:rPr lang="en-US" sz="1000" dirty="0">
+                <a:latin typeface="Courier New"/>
+                <a:cs typeface="Courier New"/>
+              </a:rPr>
+              <a:t>m</a:t>
+            </a:r>
+            <a:r>
+              <a:rPr lang="en-US" sz="1000" dirty="0" smtClean="0">
+                <a:latin typeface="Courier New"/>
+                <a:cs typeface="Courier New"/>
+              </a:rPr>
+              <a:t>agic</a:t>
+            </a:r>
+          </a:p>
+          <a:p>
+            <a:pPr algn="ctr"/>
+            <a:r>
+              <a:rPr lang="en-US" sz="1000" dirty="0" smtClean="0">
+                <a:latin typeface="Courier New"/>
+                <a:cs typeface="Courier New"/>
+              </a:rPr>
+              <a:t>(</a:t>
+            </a:r>
+            <a:r>
+              <a:rPr lang="en-US" sz="1000" dirty="0" smtClean="0">
+                <a:solidFill>
+                  <a:srgbClr val="558ED5"/>
+                </a:solidFill>
+                <a:latin typeface="Courier New"/>
+                <a:cs typeface="Courier New"/>
+              </a:rPr>
+              <a:t>unsigned char</a:t>
+            </a:r>
+            <a:r>
+              <a:rPr lang="en-US" sz="1000" dirty="0" smtClean="0">
+                <a:latin typeface="Courier New"/>
+                <a:cs typeface="Courier New"/>
+              </a:rPr>
+              <a:t>[4])</a:t>
+            </a:r>
+            <a:endParaRPr lang="en-US" sz="1000" dirty="0">
+              <a:latin typeface="Courier New"/>
+              <a:cs typeface="Courier New"/>
+            </a:endParaRPr>
+          </a:p>
+        </p:txBody>
+      </p:sp>
+      <p:sp>
+        <p:nvSpPr>
+          <p:cNvPr id="5" name="TextBox 4"/>
+          <p:cNvSpPr txBox="1"/>
+          <p:nvPr/>
+        </p:nvSpPr>
+        <p:spPr>
+          <a:xfrm>
+            <a:off x="1668965" y="679644"/>
+            <a:ext cx="825867" cy="415498"/>
+          </a:xfrm>
+          <a:prstGeom prst="rect">
+            <a:avLst/>
+          </a:prstGeom>
+          <a:noFill/>
+          <a:ln w="12700" cmpd="sng">
+            <a:solidFill>
+              <a:schemeClr val="tx1"/>
+            </a:solidFill>
+          </a:ln>
+        </p:spPr>
+        <p:txBody>
+          <a:bodyPr wrap="none" rtlCol="0">
+            <a:spAutoFit/>
+          </a:bodyPr>
+          <a:lstStyle/>
+          <a:p>
+            <a:pPr algn="ctr"/>
+            <a:r>
+              <a:rPr lang="en-US" sz="1000" dirty="0" smtClean="0">
                 <a:latin typeface="Courier New"/>
                 <a:cs typeface="Courier New"/>
               </a:rPr>
@@ -3226,14 +3298,14 @@
           <a:p>
             <a:pPr algn="ctr"/>
             <a:r>
-              <a:rPr lang="en-US" sz="1100" dirty="0" smtClean="0">
+              <a:rPr lang="en-US" sz="1000" dirty="0" smtClean="0">
                 <a:latin typeface="Courier New"/>
                 <a:cs typeface="Courier New"/>
               </a:rPr>
               <a:t>(</a:t>
             </a:r>
             <a:r>
-              <a:rPr lang="en-US" sz="1100" dirty="0" smtClean="0">
+              <a:rPr lang="en-US" sz="1000" dirty="0" smtClean="0">
                 <a:solidFill>
                   <a:schemeClr val="tx2">
                     <a:lumMod val="60000"/>
@@ -3246,13 +3318,13 @@
               <a:t>uint32</a:t>
             </a:r>
             <a:r>
-              <a:rPr lang="en-US" sz="1100" dirty="0" smtClean="0">
+              <a:rPr lang="en-US" sz="1000" dirty="0" smtClean="0">
                 <a:latin typeface="Courier New"/>
                 <a:cs typeface="Courier New"/>
               </a:rPr>
               <a:t>)</a:t>
             </a:r>
-            <a:endParaRPr lang="en-US" sz="1100" dirty="0">
+            <a:endParaRPr lang="en-US" sz="1000" dirty="0">
               <a:latin typeface="Courier New"/>
               <a:cs typeface="Courier New"/>
             </a:endParaRPr>
@@ -3267,8 +3339,8 @@
         </p:nvSpPr>
         <p:spPr>
           <a:xfrm>
-            <a:off x="1293509" y="2191730"/>
-            <a:ext cx="2601995" cy="461665"/>
+            <a:off x="1212429" y="2191730"/>
+            <a:ext cx="2268570" cy="415498"/>
           </a:xfrm>
           <a:prstGeom prst="rect">
             <a:avLst/>
@@ -3289,21 +3361,28 @@
           <a:p>
             <a:pPr algn="ctr"/>
             <a:r>
-              <a:rPr lang="en-US" sz="1200" dirty="0" err="1" smtClean="0">
-                <a:latin typeface="Courier New"/>
-                <a:cs typeface="Courier New"/>
-              </a:rPr>
-              <a:t>uri</a:t>
-            </a:r>
-            <a:r>
-              <a:rPr lang="en-US" sz="1200" dirty="0" smtClean="0">
-                <a:latin typeface="Courier New"/>
-                <a:cs typeface="Courier New"/>
-              </a:rPr>
-              <a:t> (</a:t>
-            </a:r>
-            <a:r>
-              <a:rPr lang="en-US" sz="1200" dirty="0" smtClean="0">
+              <a:rPr lang="en-US" sz="1050" dirty="0" err="1" smtClean="0">
+                <a:latin typeface="Courier New"/>
+                <a:cs typeface="Courier New"/>
+              </a:rPr>
+              <a:t>url</a:t>
+            </a:r>
+            <a:r>
+              <a:rPr lang="en-US" sz="1050" dirty="0" smtClean="0">
+                <a:latin typeface="Courier New"/>
+                <a:cs typeface="Courier New"/>
+              </a:rPr>
+              <a:t> </a:t>
+            </a:r>
+            <a:r>
+              <a:rPr lang="en-US" sz="1050" dirty="0" smtClean="0">
+                <a:latin typeface="Courier New"/>
+                <a:cs typeface="Courier New"/>
+              </a:rPr>
+              <a:t>(</a:t>
+            </a:r>
+            <a:r>
+              <a:rPr lang="en-US" sz="1050" dirty="0" smtClean="0">
                 <a:solidFill>
                   <a:schemeClr val="tx2">
                     <a:lumMod val="60000"/>
@@ -3316,21 +3395,21 @@
               <a:t>UTF-8</a:t>
             </a:r>
             <a:r>
-              <a:rPr lang="en-US" sz="1200" dirty="0" smtClean="0">
+              <a:rPr lang="en-US" sz="1050" dirty="0" smtClean="0">
                 <a:latin typeface="Courier New"/>
                 <a:cs typeface="Courier New"/>
               </a:rPr>
               <a:t>) </a:t>
             </a:r>
             <a:r>
-              <a:rPr lang="en-US" sz="1200" dirty="0">
+              <a:rPr lang="en-US" sz="1050" dirty="0">
                 <a:latin typeface="Courier New"/>
                 <a:cs typeface="Courier New"/>
               </a:rPr>
               <a:t>or </a:t>
             </a:r>
             <a:r>
-              <a:rPr lang="en-US" sz="1200" dirty="0" smtClean="0">
+              <a:rPr lang="en-US" sz="1050" dirty="0" smtClean="0">
                 <a:latin typeface="Courier New"/>
                 <a:cs typeface="Courier New"/>
               </a:rPr>
@@ -3339,7 +3418,7 @@
           </a:p>
           <a:p>
             <a:pPr algn="ctr"/>
-            <a:endParaRPr lang="en-US" sz="1200" dirty="0" smtClean="0">
+            <a:endParaRPr lang="en-US" sz="1050" dirty="0" smtClean="0">
               <a:latin typeface="Courier New"/>
               <a:cs typeface="Courier New"/>
             </a:endParaRPr>
@@ -3354,7 +3433,7 @@
         </p:nvSpPr>
         <p:spPr>
           <a:xfrm>
-            <a:off x="1927026" y="3044329"/>
+            <a:off x="1679234" y="3044329"/>
             <a:ext cx="1342573" cy="616860"/>
           </a:xfrm>
           <a:prstGeom prst="ellipse">
@@ -3384,13 +3463,13 @@
           <a:p>
             <a:pPr algn="ctr"/>
             <a:r>
-              <a:rPr lang="en-US" sz="1200" dirty="0" smtClean="0">
+              <a:rPr lang="en-US" sz="1050" dirty="0" smtClean="0">
                 <a:latin typeface="Courier New"/>
                 <a:cs typeface="Courier New"/>
               </a:rPr>
               <a:t>External data</a:t>
             </a:r>
-            <a:endParaRPr lang="en-US" sz="1200" dirty="0">
+            <a:endParaRPr lang="en-US" sz="1050" dirty="0">
               <a:latin typeface="Courier New"/>
               <a:cs typeface="Courier New"/>
             </a:endParaRPr>
@@ -3405,8 +3484,8 @@
         </p:nvCxnSpPr>
         <p:spPr>
           <a:xfrm>
-            <a:off x="176306" y="399926"/>
-            <a:ext cx="8679875" cy="0"/>
+            <a:off x="67190" y="398799"/>
+            <a:ext cx="8881331" cy="0"/>
           </a:xfrm>
           <a:prstGeom prst="straightConnector1">
             <a:avLst/>
@@ -3442,8 +3521,8 @@
         </p:nvSpPr>
         <p:spPr>
           <a:xfrm>
-            <a:off x="3829196" y="122927"/>
-            <a:ext cx="1374094" cy="261610"/>
+            <a:off x="3918616" y="122927"/>
+            <a:ext cx="1306768" cy="253916"/>
           </a:xfrm>
           <a:prstGeom prst="rect">
             <a:avLst/>
@@ -3462,13 +3541,13 @@
           <a:p>
             <a:pPr algn="ctr"/>
             <a:r>
-              <a:rPr lang="en-US" sz="1100" dirty="0" smtClean="0">
+              <a:rPr lang="en-US" sz="1000" dirty="0" smtClean="0">
                 <a:latin typeface="Courier New"/>
                 <a:cs typeface="Courier New"/>
               </a:rPr>
               <a:t>28-byte header</a:t>
             </a:r>
-            <a:endParaRPr lang="en-US" sz="1100" dirty="0">
+            <a:endParaRPr lang="en-US" sz="1000" dirty="0">
               <a:latin typeface="Courier New"/>
               <a:cs typeface="Courier New"/>
             </a:endParaRPr>
@@ -3486,8 +3565,8 @@
         </p:nvCxnSpPr>
         <p:spPr>
           <a:xfrm>
-            <a:off x="2594507" y="2653395"/>
-            <a:ext cx="3806" cy="390934"/>
+            <a:off x="2346714" y="2607228"/>
+            <a:ext cx="3807" cy="437101"/>
           </a:xfrm>
           <a:prstGeom prst="straightConnector1">
             <a:avLst/>
@@ -3523,8 +3602,8 @@
         </p:nvSpPr>
         <p:spPr>
           <a:xfrm>
-            <a:off x="3784601" y="661915"/>
-            <a:ext cx="1544012" cy="430887"/>
+            <a:off x="3480999" y="679644"/>
+            <a:ext cx="1787669" cy="415498"/>
           </a:xfrm>
           <a:prstGeom prst="rect">
             <a:avLst/>
@@ -3544,24 +3623,28 @@
           <a:p>
             <a:pPr algn="ctr"/>
             <a:r>
-              <a:rPr lang="en-US" sz="1100" dirty="0" smtClean="0">
-                <a:latin typeface="Courier New"/>
-                <a:cs typeface="Courier New"/>
-              </a:rPr>
-              <a:t>batchTableLength</a:t>
-            </a:r>
+              <a:rPr lang="en-US" sz="1000" dirty="0" smtClean="0">
+                <a:latin typeface="Courier New"/>
+                <a:cs typeface="Courier New"/>
+              </a:rPr>
+              <a:t>batchTableByteLength</a:t>
+            </a:r>
+            <a:endParaRPr lang="en-US" sz="1000" dirty="0" smtClean="0">
+              <a:latin typeface="Courier New"/>
+              <a:cs typeface="Courier New"/>
+            </a:endParaRPr>
           </a:p>
           <a:p>
             <a:pPr algn="ctr"/>
             <a:r>
-              <a:rPr lang="en-US" sz="1100" dirty="0" smtClean="0">
+              <a:rPr lang="en-US" sz="1000" dirty="0" smtClean="0">
                 <a:latin typeface="Courier New"/>
                 <a:cs typeface="Courier New"/>
               </a:rPr>
               <a:t>(</a:t>
             </a:r>
             <a:r>
-              <a:rPr lang="en-US" sz="1100" dirty="0" smtClean="0">
+              <a:rPr lang="en-US" sz="1000" dirty="0" smtClean="0">
                 <a:solidFill>
                   <a:schemeClr val="tx2">
                     <a:lumMod val="60000"/>
@@ -3574,13 +3657,13 @@
               <a:t>uint32</a:t>
             </a:r>
             <a:r>
-              <a:rPr lang="en-US" sz="1100" dirty="0" smtClean="0">
+              <a:rPr lang="en-US" sz="1000" dirty="0" smtClean="0">
                 <a:latin typeface="Courier New"/>
                 <a:cs typeface="Courier New"/>
               </a:rPr>
               <a:t>)</a:t>
             </a:r>
-            <a:endParaRPr lang="en-US" sz="1100" dirty="0">
+            <a:endParaRPr lang="en-US" sz="1000" dirty="0">
               <a:latin typeface="Courier New"/>
               <a:cs typeface="Courier New"/>
             </a:endParaRPr>
@@ -3595,8 +3678,8 @@
         </p:nvSpPr>
         <p:spPr>
           <a:xfrm>
-            <a:off x="172138" y="2191730"/>
-            <a:ext cx="1114408" cy="461665"/>
+            <a:off x="236258" y="2191730"/>
+            <a:ext cx="986167" cy="415498"/>
           </a:xfrm>
           <a:prstGeom prst="rect">
             <a:avLst/>
@@ -3617,7 +3700,7 @@
           <a:p>
             <a:pPr algn="ctr"/>
             <a:r>
-              <a:rPr lang="en-US" sz="1200" dirty="0" smtClean="0">
+              <a:rPr lang="en-US" sz="1050" dirty="0" smtClean="0">
                 <a:latin typeface="Courier New"/>
                 <a:cs typeface="Courier New"/>
               </a:rPr>
@@ -3626,7 +3709,7 @@
           </a:p>
           <a:p>
             <a:pPr algn="ctr"/>
-            <a:endParaRPr lang="en-US" sz="1200" dirty="0">
+            <a:endParaRPr lang="en-US" sz="1050" dirty="0">
               <a:latin typeface="Courier New"/>
               <a:cs typeface="Courier New"/>
             </a:endParaRPr>
@@ -3641,8 +3724,8 @@
         </p:nvSpPr>
         <p:spPr>
           <a:xfrm>
-            <a:off x="2750344" y="662766"/>
-            <a:ext cx="1034257" cy="430887"/>
+            <a:off x="2494832" y="679644"/>
+            <a:ext cx="986167" cy="415498"/>
           </a:xfrm>
           <a:prstGeom prst="rect">
             <a:avLst/>
@@ -3662,7 +3745,7 @@
           <a:p>
             <a:pPr algn="ctr"/>
             <a:r>
-              <a:rPr lang="en-US" sz="1100" dirty="0" smtClean="0">
+              <a:rPr lang="en-US" sz="1000" dirty="0" smtClean="0">
                 <a:latin typeface="Courier New"/>
                 <a:cs typeface="Courier New"/>
               </a:rPr>
@@ -3672,14 +3755,14 @@
           <a:p>
             <a:pPr algn="ctr"/>
             <a:r>
-              <a:rPr lang="en-US" sz="1100" dirty="0" smtClean="0">
+              <a:rPr lang="en-US" sz="1000" dirty="0" smtClean="0">
                 <a:latin typeface="Courier New"/>
                 <a:cs typeface="Courier New"/>
               </a:rPr>
               <a:t>(</a:t>
             </a:r>
             <a:r>
-              <a:rPr lang="en-US" sz="1100" dirty="0" smtClean="0">
+              <a:rPr lang="en-US" sz="1000" dirty="0" smtClean="0">
                 <a:solidFill>
                   <a:schemeClr val="tx2">
                     <a:lumMod val="60000"/>
@@ -3692,13 +3775,13 @@
               <a:t>uint32</a:t>
             </a:r>
             <a:r>
-              <a:rPr lang="en-US" sz="1100" dirty="0" smtClean="0">
+              <a:rPr lang="en-US" sz="1000" dirty="0" smtClean="0">
                 <a:latin typeface="Courier New"/>
                 <a:cs typeface="Courier New"/>
               </a:rPr>
               <a:t>)</a:t>
             </a:r>
-            <a:endParaRPr lang="en-US" sz="1100" dirty="0">
+            <a:endParaRPr lang="en-US" sz="1000" dirty="0">
               <a:latin typeface="Courier New"/>
               <a:cs typeface="Courier New"/>
             </a:endParaRPr>
@@ -3713,8 +3796,8 @@
         </p:nvSpPr>
         <p:spPr>
           <a:xfrm>
-            <a:off x="5328613" y="664255"/>
-            <a:ext cx="1034257" cy="430887"/>
+            <a:off x="5268668" y="679644"/>
+            <a:ext cx="1306768" cy="415498"/>
           </a:xfrm>
           <a:prstGeom prst="rect">
             <a:avLst/>
@@ -3734,24 +3817,28 @@
           <a:p>
             <a:pPr algn="ctr"/>
             <a:r>
-              <a:rPr lang="en-US" sz="1100" dirty="0" smtClean="0">
-                <a:latin typeface="Courier New"/>
-                <a:cs typeface="Courier New"/>
-              </a:rPr>
-              <a:t>gltfLength</a:t>
-            </a:r>
+              <a:rPr lang="en-US" sz="1000" dirty="0" smtClean="0">
+                <a:latin typeface="Courier New"/>
+                <a:cs typeface="Courier New"/>
+              </a:rPr>
+              <a:t>gltfByteLength</a:t>
+            </a:r>
+            <a:endParaRPr lang="en-US" sz="1000" dirty="0" smtClean="0">
+              <a:latin typeface="Courier New"/>
+              <a:cs typeface="Courier New"/>
+            </a:endParaRPr>
           </a:p>
           <a:p>
             <a:pPr algn="ctr"/>
             <a:r>
-              <a:rPr lang="en-US" sz="1100" dirty="0" smtClean="0">
+              <a:rPr lang="en-US" sz="1000" dirty="0" smtClean="0">
                 <a:latin typeface="Courier New"/>
                 <a:cs typeface="Courier New"/>
               </a:rPr>
               <a:t>(</a:t>
             </a:r>
             <a:r>
-              <a:rPr lang="en-US" sz="1100" dirty="0" smtClean="0">
+              <a:rPr lang="en-US" sz="1000" dirty="0" smtClean="0">
                 <a:solidFill>
                   <a:schemeClr val="tx2">
                     <a:lumMod val="60000"/>
@@ -3764,13 +3851,13 @@
               <a:t>uint32</a:t>
             </a:r>
             <a:r>
-              <a:rPr lang="en-US" sz="1100" dirty="0" smtClean="0">
+              <a:rPr lang="en-US" sz="1000" dirty="0" smtClean="0">
                 <a:latin typeface="Courier New"/>
                 <a:cs typeface="Courier New"/>
               </a:rPr>
               <a:t>)</a:t>
             </a:r>
-            <a:endParaRPr lang="en-US" sz="1100" dirty="0">
+            <a:endParaRPr lang="en-US" sz="1000" dirty="0">
               <a:latin typeface="Courier New"/>
               <a:cs typeface="Courier New"/>
             </a:endParaRPr>
@@ -3785,8 +3872,8 @@
         </p:nvSpPr>
         <p:spPr>
           <a:xfrm>
-            <a:off x="6362870" y="663475"/>
-            <a:ext cx="1034257" cy="430887"/>
+            <a:off x="6575436" y="679644"/>
+            <a:ext cx="986167" cy="415498"/>
           </a:xfrm>
           <a:prstGeom prst="rect">
             <a:avLst/>
@@ -3806,7 +3893,7 @@
           <a:p>
             <a:pPr algn="ctr"/>
             <a:r>
-              <a:rPr lang="en-US" sz="1100" dirty="0" smtClean="0">
+              <a:rPr lang="en-US" sz="1000" dirty="0" smtClean="0">
                 <a:latin typeface="Courier New"/>
                 <a:cs typeface="Courier New"/>
               </a:rPr>
@@ -3816,14 +3903,14 @@
           <a:p>
             <a:pPr algn="ctr"/>
             <a:r>
-              <a:rPr lang="en-US" sz="1100" dirty="0" smtClean="0">
+              <a:rPr lang="en-US" sz="1000" dirty="0" smtClean="0">
                 <a:latin typeface="Courier New"/>
                 <a:cs typeface="Courier New"/>
               </a:rPr>
               <a:t>(</a:t>
             </a:r>
             <a:r>
-              <a:rPr lang="en-US" sz="1100" dirty="0" smtClean="0">
+              <a:rPr lang="en-US" sz="1000" dirty="0" smtClean="0">
                 <a:solidFill>
                   <a:schemeClr val="tx2">
                     <a:lumMod val="60000"/>
@@ -3836,13 +3923,13 @@
               <a:t>uint32</a:t>
             </a:r>
             <a:r>
-              <a:rPr lang="en-US" sz="1100" dirty="0" smtClean="0">
+              <a:rPr lang="en-US" sz="1000" dirty="0" smtClean="0">
                 <a:latin typeface="Courier New"/>
                 <a:cs typeface="Courier New"/>
               </a:rPr>
               <a:t>)</a:t>
             </a:r>
-            <a:endParaRPr lang="en-US" sz="1100" dirty="0">
+            <a:endParaRPr lang="en-US" sz="1000" dirty="0">
               <a:latin typeface="Courier New"/>
               <a:cs typeface="Courier New"/>
             </a:endParaRPr>
@@ -3851,86 +3938,14 @@
       </p:sp>
       <p:sp>
         <p:nvSpPr>
-          <p:cNvPr id="17" name="TextBox 16"/>
-          <p:cNvSpPr txBox="1"/>
-          <p:nvPr/>
-        </p:nvSpPr>
-        <p:spPr>
-          <a:xfrm>
-            <a:off x="7397127" y="664255"/>
-            <a:ext cx="1459054" cy="430887"/>
-          </a:xfrm>
-          <a:prstGeom prst="rect">
-            <a:avLst/>
-          </a:prstGeom>
-          <a:noFill/>
-          <a:ln w="12700" cmpd="sng">
-            <a:solidFill>
-              <a:schemeClr val="tx1"/>
-            </a:solidFill>
-          </a:ln>
-        </p:spPr>
-        <p:txBody>
-          <a:bodyPr wrap="none" rtlCol="0">
-            <a:spAutoFit/>
-          </a:bodyPr>
-          <a:lstStyle/>
-          <a:p>
-            <a:pPr algn="ctr"/>
-            <a:r>
-              <a:rPr lang="en-US" sz="1100" dirty="0" smtClean="0">
-                <a:latin typeface="Courier New"/>
-                <a:cs typeface="Courier New"/>
-              </a:rPr>
-              <a:t>instancesLength</a:t>
-            </a:r>
-          </a:p>
-          <a:p>
-            <a:pPr algn="ctr"/>
-            <a:r>
-              <a:rPr lang="en-US" sz="1100" dirty="0" smtClean="0">
-                <a:latin typeface="Courier New"/>
-                <a:cs typeface="Courier New"/>
-              </a:rPr>
-              <a:t>(</a:t>
-            </a:r>
-            <a:r>
-              <a:rPr lang="en-US" sz="1100" dirty="0" smtClean="0">
-                <a:solidFill>
-                  <a:schemeClr val="tx2">
-                    <a:lumMod val="60000"/>
-                    <a:lumOff val="40000"/>
-                  </a:schemeClr>
-                </a:solidFill>
-                <a:latin typeface="Courier New"/>
-                <a:cs typeface="Courier New"/>
-              </a:rPr>
-              <a:t>uint32</a:t>
-            </a:r>
-            <a:r>
-              <a:rPr lang="en-US" sz="1100" dirty="0" smtClean="0">
-                <a:latin typeface="Courier New"/>
-                <a:cs typeface="Courier New"/>
-              </a:rPr>
-              <a:t>)</a:t>
-            </a:r>
-            <a:endParaRPr lang="en-US" sz="1100" dirty="0">
-              <a:latin typeface="Courier New"/>
-              <a:cs typeface="Courier New"/>
-            </a:endParaRPr>
-          </a:p>
-        </p:txBody>
-      </p:sp>
-      <p:sp>
-        <p:nvSpPr>
           <p:cNvPr id="20" name="TextBox 19"/>
           <p:cNvSpPr txBox="1"/>
           <p:nvPr/>
         </p:nvSpPr>
         <p:spPr>
           <a:xfrm>
-            <a:off x="8856181" y="664255"/>
-            <a:ext cx="277640" cy="461665"/>
+            <a:off x="8874889" y="664255"/>
+            <a:ext cx="269625" cy="430887"/>
           </a:xfrm>
           <a:prstGeom prst="rect">
             <a:avLst/>
@@ -3948,7 +3963,7 @@
           <a:p>
             <a:pPr algn="ctr"/>
             <a:r>
-              <a:rPr lang="en-US" sz="1200" dirty="0" smtClean="0">
+              <a:rPr lang="en-US" sz="1050" dirty="0" smtClean="0">
                 <a:latin typeface="Courier New"/>
                 <a:cs typeface="Courier New"/>
               </a:rPr>
@@ -3957,7 +3972,7 @@
           </a:p>
           <a:p>
             <a:pPr algn="ctr"/>
-            <a:endParaRPr lang="en-US" sz="1200" dirty="0" smtClean="0">
+            <a:endParaRPr lang="en-US" sz="1050" dirty="0" smtClean="0">
               <a:latin typeface="Courier New"/>
               <a:cs typeface="Courier New"/>
             </a:endParaRPr>
@@ -3972,8 +3987,8 @@
         </p:nvSpPr>
         <p:spPr>
           <a:xfrm>
-            <a:off x="-59656" y="2191730"/>
-            <a:ext cx="277640" cy="461665"/>
+            <a:off x="-55649" y="2191730"/>
+            <a:ext cx="269625" cy="430887"/>
           </a:xfrm>
           <a:prstGeom prst="rect">
             <a:avLst/>
@@ -3991,7 +4006,7 @@
           <a:p>
             <a:pPr algn="ctr"/>
             <a:r>
-              <a:rPr lang="en-US" sz="1200" dirty="0" smtClean="0">
+              <a:rPr lang="en-US" sz="1050" dirty="0" smtClean="0">
                 <a:latin typeface="Courier New"/>
                 <a:cs typeface="Courier New"/>
               </a:rPr>
@@ -4000,7 +4015,7 @@
           </a:p>
           <a:p>
             <a:pPr algn="ctr"/>
-            <a:endParaRPr lang="en-US" sz="1200" dirty="0" smtClean="0">
+            <a:endParaRPr lang="en-US" sz="1050" dirty="0" smtClean="0">
               <a:latin typeface="Courier New"/>
               <a:cs typeface="Courier New"/>
             </a:endParaRPr>
@@ -4015,8 +4030,8 @@
         </p:nvSpPr>
         <p:spPr>
           <a:xfrm>
-            <a:off x="3895504" y="2191730"/>
-            <a:ext cx="1207382" cy="461665"/>
+            <a:off x="3480999" y="2191730"/>
+            <a:ext cx="1066318" cy="415498"/>
           </a:xfrm>
           <a:prstGeom prst="rect">
             <a:avLst/>
@@ -4037,20 +4052,20 @@
           <a:p>
             <a:pPr algn="ctr"/>
             <a:r>
-              <a:rPr lang="en-US" sz="1200" dirty="0">
+              <a:rPr lang="en-US" sz="1050" dirty="0">
                 <a:latin typeface="Courier New"/>
                 <a:cs typeface="Courier New"/>
               </a:rPr>
               <a:t>instances[]</a:t>
             </a:r>
-            <a:endParaRPr lang="en-US" sz="1200" dirty="0" smtClean="0">
+            <a:endParaRPr lang="en-US" sz="1050" dirty="0" smtClean="0">
               <a:latin typeface="Courier New"/>
               <a:cs typeface="Courier New"/>
             </a:endParaRPr>
           </a:p>
           <a:p>
             <a:pPr algn="ctr"/>
-            <a:endParaRPr lang="en-US" sz="1200" dirty="0" smtClean="0">
+            <a:endParaRPr lang="en-US" sz="1050" dirty="0" smtClean="0">
               <a:latin typeface="Courier New"/>
               <a:cs typeface="Courier New"/>
             </a:endParaRPr>
@@ -4066,7 +4081,7 @@
         <p:spPr>
           <a:xfrm>
             <a:off x="176306" y="1959095"/>
-            <a:ext cx="4926580" cy="0"/>
+            <a:ext cx="4395694" cy="0"/>
           </a:xfrm>
           <a:prstGeom prst="straightConnector1">
             <a:avLst/>
@@ -4102,8 +4117,8 @@
         </p:nvSpPr>
         <p:spPr>
           <a:xfrm>
-            <a:off x="2377344" y="1656941"/>
-            <a:ext cx="524504" cy="261610"/>
+            <a:off x="2127932" y="1656941"/>
+            <a:ext cx="492443" cy="246221"/>
           </a:xfrm>
           <a:prstGeom prst="rect">
             <a:avLst/>
@@ -4122,13 +4137,13 @@
           <a:p>
             <a:pPr algn="ctr"/>
             <a:r>
-              <a:rPr lang="en-US" sz="1100" dirty="0" smtClean="0">
+              <a:rPr lang="en-US" sz="1000" dirty="0" smtClean="0">
                 <a:latin typeface="Courier New"/>
                 <a:cs typeface="Courier New"/>
               </a:rPr>
               <a:t>body</a:t>
             </a:r>
-            <a:endParaRPr lang="en-US" sz="1100" dirty="0">
+            <a:endParaRPr lang="en-US" sz="1000" dirty="0">
               <a:latin typeface="Courier New"/>
               <a:cs typeface="Courier New"/>
             </a:endParaRPr>
@@ -4143,8 +4158,8 @@
         </p:nvSpPr>
         <p:spPr>
           <a:xfrm>
-            <a:off x="217984" y="4905429"/>
-            <a:ext cx="949299" cy="430887"/>
+            <a:off x="239625" y="4910682"/>
+            <a:ext cx="906017" cy="415498"/>
           </a:xfrm>
           <a:prstGeom prst="rect">
             <a:avLst/>
@@ -4164,7 +4179,7 @@
           <a:p>
             <a:pPr algn="ctr"/>
             <a:r>
-              <a:rPr lang="en-US" sz="1100" dirty="0" smtClean="0">
+              <a:rPr lang="en-US" sz="1000" dirty="0" smtClean="0">
                 <a:latin typeface="Courier New"/>
                 <a:cs typeface="Courier New"/>
               </a:rPr>
@@ -4174,14 +4189,14 @@
           <a:p>
             <a:pPr algn="ctr"/>
             <a:r>
-              <a:rPr lang="en-US" sz="1100" dirty="0" smtClean="0">
+              <a:rPr lang="en-US" sz="1000" dirty="0" smtClean="0">
                 <a:latin typeface="Courier New"/>
                 <a:cs typeface="Courier New"/>
               </a:rPr>
               <a:t>(</a:t>
             </a:r>
             <a:r>
-              <a:rPr lang="en-US" sz="1100" dirty="0" smtClean="0">
+              <a:rPr lang="en-US" sz="1000" dirty="0" smtClean="0">
                 <a:solidFill>
                   <a:schemeClr val="tx2">
                     <a:lumMod val="60000"/>
@@ -4194,13 +4209,13 @@
               <a:t>double</a:t>
             </a:r>
             <a:r>
-              <a:rPr lang="en-US" sz="1100" dirty="0" smtClean="0">
+              <a:rPr lang="en-US" sz="1000" dirty="0" smtClean="0">
                 <a:latin typeface="Courier New"/>
                 <a:cs typeface="Courier New"/>
               </a:rPr>
               <a:t>)</a:t>
             </a:r>
-            <a:endParaRPr lang="en-US" sz="1100" dirty="0">
+            <a:endParaRPr lang="en-US" sz="1000" dirty="0">
               <a:latin typeface="Courier New"/>
               <a:cs typeface="Courier New"/>
             </a:endParaRPr>
@@ -4216,7 +4231,7 @@
         <p:spPr>
           <a:xfrm>
             <a:off x="217984" y="4732440"/>
-            <a:ext cx="2672719" cy="0"/>
+            <a:ext cx="2575160" cy="0"/>
           </a:xfrm>
           <a:prstGeom prst="straightConnector1">
             <a:avLst/>
@@ -4252,8 +4267,8 @@
         </p:nvSpPr>
         <p:spPr>
           <a:xfrm>
-            <a:off x="1122174" y="4430507"/>
-            <a:ext cx="864339" cy="261610"/>
+            <a:off x="1092631" y="4430507"/>
+            <a:ext cx="825867" cy="253916"/>
           </a:xfrm>
           <a:prstGeom prst="rect">
             <a:avLst/>
@@ -4272,13 +4287,13 @@
           <a:p>
             <a:pPr algn="ctr"/>
             <a:r>
-              <a:rPr lang="en-US" sz="1100" dirty="0" smtClean="0">
+              <a:rPr lang="en-US" sz="1000" dirty="0" smtClean="0">
                 <a:latin typeface="Courier New"/>
                 <a:cs typeface="Courier New"/>
               </a:rPr>
               <a:t>instance</a:t>
             </a:r>
-            <a:endParaRPr lang="en-US" sz="1100" dirty="0">
+            <a:endParaRPr lang="en-US" sz="1000" dirty="0">
               <a:latin typeface="Courier New"/>
               <a:cs typeface="Courier New"/>
             </a:endParaRPr>
@@ -4293,8 +4308,8 @@
         </p:nvSpPr>
         <p:spPr>
           <a:xfrm>
-            <a:off x="2026364" y="4905500"/>
-            <a:ext cx="864339" cy="430887"/>
+            <a:off x="1967277" y="4910682"/>
+            <a:ext cx="825867" cy="415498"/>
           </a:xfrm>
           <a:prstGeom prst="rect">
             <a:avLst/>
@@ -4314,7 +4329,7 @@
           <a:p>
             <a:pPr algn="ctr"/>
             <a:r>
-              <a:rPr lang="en-US" sz="1100" dirty="0" smtClean="0">
+              <a:rPr lang="en-US" sz="1000" dirty="0" smtClean="0">
                 <a:latin typeface="Courier New"/>
                 <a:cs typeface="Courier New"/>
               </a:rPr>
@@ -4324,14 +4339,14 @@
           <a:p>
             <a:pPr algn="ctr"/>
             <a:r>
-              <a:rPr lang="en-US" sz="1100" dirty="0" smtClean="0">
+              <a:rPr lang="en-US" sz="1000" dirty="0" smtClean="0">
                 <a:latin typeface="Courier New"/>
                 <a:cs typeface="Courier New"/>
               </a:rPr>
               <a:t>(</a:t>
             </a:r>
             <a:r>
-              <a:rPr lang="en-US" sz="1100" dirty="0" smtClean="0">
+              <a:rPr lang="en-US" sz="1000" dirty="0" smtClean="0">
                 <a:solidFill>
                   <a:schemeClr val="tx2">
                     <a:lumMod val="60000"/>
@@ -4344,13 +4359,13 @@
               <a:t>uint32</a:t>
             </a:r>
             <a:r>
-              <a:rPr lang="en-US" sz="1100" dirty="0" smtClean="0">
+              <a:rPr lang="en-US" sz="1000" dirty="0" smtClean="0">
                 <a:latin typeface="Courier New"/>
                 <a:cs typeface="Courier New"/>
               </a:rPr>
               <a:t>)</a:t>
             </a:r>
-            <a:endParaRPr lang="en-US" sz="1100" dirty="0">
+            <a:endParaRPr lang="en-US" sz="1000" dirty="0">
               <a:latin typeface="Courier New"/>
               <a:cs typeface="Courier New"/>
             </a:endParaRPr>
@@ -4365,8 +4380,8 @@
         </p:nvSpPr>
         <p:spPr>
           <a:xfrm>
-            <a:off x="1167283" y="4905500"/>
-            <a:ext cx="864339" cy="430887"/>
+            <a:off x="1139738" y="4910682"/>
+            <a:ext cx="825867" cy="415498"/>
           </a:xfrm>
           <a:prstGeom prst="rect">
             <a:avLst/>
@@ -4386,7 +4401,7 @@
           <a:p>
             <a:pPr algn="ctr"/>
             <a:r>
-              <a:rPr lang="en-US" sz="1100" dirty="0" smtClean="0">
+              <a:rPr lang="en-US" sz="1000" dirty="0" smtClean="0">
                 <a:latin typeface="Courier New"/>
                 <a:cs typeface="Courier New"/>
               </a:rPr>
@@ -4396,14 +4411,14 @@
           <a:p>
             <a:pPr algn="ctr"/>
             <a:r>
-              <a:rPr lang="en-US" sz="1100" dirty="0" smtClean="0">
+              <a:rPr lang="en-US" sz="1000" dirty="0" smtClean="0">
                 <a:latin typeface="Courier New"/>
                 <a:cs typeface="Courier New"/>
               </a:rPr>
               <a:t>(</a:t>
             </a:r>
             <a:r>
-              <a:rPr lang="en-US" sz="1100" dirty="0" smtClean="0">
+              <a:rPr lang="en-US" sz="1000" dirty="0" smtClean="0">
                 <a:solidFill>
                   <a:schemeClr val="tx2">
                     <a:lumMod val="60000"/>
@@ -4416,13 +4431,13 @@
               <a:t>double</a:t>
             </a:r>
             <a:r>
-              <a:rPr lang="en-US" sz="1100" dirty="0" smtClean="0">
+              <a:rPr lang="en-US" sz="1000" dirty="0" smtClean="0">
                 <a:latin typeface="Courier New"/>
                 <a:cs typeface="Courier New"/>
               </a:rPr>
               <a:t>)</a:t>
             </a:r>
-            <a:endParaRPr lang="en-US" sz="1100" dirty="0">
+            <a:endParaRPr lang="en-US" sz="1000" dirty="0">
               <a:latin typeface="Courier New"/>
               <a:cs typeface="Courier New"/>
             </a:endParaRPr>

</xml_diff>

<commit_message>
Change figure to uint16
</commit_message>
<xml_diff>
--- a/TileFormats/Instanced3DModel/figures/Figures.pptx
+++ b/TileFormats/Instanced3DModel/figures/Figures.pptx
@@ -304,7 +304,7 @@
           <a:p>
             <a:fld id="{E44376AC-B3C2-8643-B9A3-A6905164CDF3}" type="datetimeFigureOut">
               <a:rPr lang="en-US" smtClean="0"/>
-              <a:t>11/7/2015</a:t>
+              <a:t>11/8/2015</a:t>
             </a:fld>
             <a:endParaRPr lang="en-US"/>
           </a:p>
@@ -474,7 +474,7 @@
           <a:p>
             <a:fld id="{E44376AC-B3C2-8643-B9A3-A6905164CDF3}" type="datetimeFigureOut">
               <a:rPr lang="en-US" smtClean="0"/>
-              <a:t>11/7/2015</a:t>
+              <a:t>11/8/2015</a:t>
             </a:fld>
             <a:endParaRPr lang="en-US"/>
           </a:p>
@@ -654,7 +654,7 @@
           <a:p>
             <a:fld id="{E44376AC-B3C2-8643-B9A3-A6905164CDF3}" type="datetimeFigureOut">
               <a:rPr lang="en-US" smtClean="0"/>
-              <a:t>11/7/2015</a:t>
+              <a:t>11/8/2015</a:t>
             </a:fld>
             <a:endParaRPr lang="en-US"/>
           </a:p>
@@ -824,7 +824,7 @@
           <a:p>
             <a:fld id="{E44376AC-B3C2-8643-B9A3-A6905164CDF3}" type="datetimeFigureOut">
               <a:rPr lang="en-US" smtClean="0"/>
-              <a:t>11/7/2015</a:t>
+              <a:t>11/8/2015</a:t>
             </a:fld>
             <a:endParaRPr lang="en-US"/>
           </a:p>
@@ -1070,7 +1070,7 @@
           <a:p>
             <a:fld id="{E44376AC-B3C2-8643-B9A3-A6905164CDF3}" type="datetimeFigureOut">
               <a:rPr lang="en-US" smtClean="0"/>
-              <a:t>11/7/2015</a:t>
+              <a:t>11/8/2015</a:t>
             </a:fld>
             <a:endParaRPr lang="en-US"/>
           </a:p>
@@ -1358,7 +1358,7 @@
           <a:p>
             <a:fld id="{E44376AC-B3C2-8643-B9A3-A6905164CDF3}" type="datetimeFigureOut">
               <a:rPr lang="en-US" smtClean="0"/>
-              <a:t>11/7/2015</a:t>
+              <a:t>11/8/2015</a:t>
             </a:fld>
             <a:endParaRPr lang="en-US"/>
           </a:p>
@@ -1780,7 +1780,7 @@
           <a:p>
             <a:fld id="{E44376AC-B3C2-8643-B9A3-A6905164CDF3}" type="datetimeFigureOut">
               <a:rPr lang="en-US" smtClean="0"/>
-              <a:t>11/7/2015</a:t>
+              <a:t>11/8/2015</a:t>
             </a:fld>
             <a:endParaRPr lang="en-US"/>
           </a:p>
@@ -1898,7 +1898,7 @@
           <a:p>
             <a:fld id="{E44376AC-B3C2-8643-B9A3-A6905164CDF3}" type="datetimeFigureOut">
               <a:rPr lang="en-US" smtClean="0"/>
-              <a:t>11/7/2015</a:t>
+              <a:t>11/8/2015</a:t>
             </a:fld>
             <a:endParaRPr lang="en-US"/>
           </a:p>
@@ -1993,7 +1993,7 @@
           <a:p>
             <a:fld id="{E44376AC-B3C2-8643-B9A3-A6905164CDF3}" type="datetimeFigureOut">
               <a:rPr lang="en-US" smtClean="0"/>
-              <a:t>11/7/2015</a:t>
+              <a:t>11/8/2015</a:t>
             </a:fld>
             <a:endParaRPr lang="en-US"/>
           </a:p>
@@ -2270,7 +2270,7 @@
           <a:p>
             <a:fld id="{E44376AC-B3C2-8643-B9A3-A6905164CDF3}" type="datetimeFigureOut">
               <a:rPr lang="en-US" smtClean="0"/>
-              <a:t>11/7/2015</a:t>
+              <a:t>11/8/2015</a:t>
             </a:fld>
             <a:endParaRPr lang="en-US"/>
           </a:p>
@@ -2523,7 +2523,7 @@
           <a:p>
             <a:fld id="{E44376AC-B3C2-8643-B9A3-A6905164CDF3}" type="datetimeFigureOut">
               <a:rPr lang="en-US" smtClean="0"/>
-              <a:t>11/7/2015</a:t>
+              <a:t>11/8/2015</a:t>
             </a:fld>
             <a:endParaRPr lang="en-US"/>
           </a:p>
@@ -2736,7 +2736,7 @@
           <a:p>
             <a:fld id="{E44376AC-B3C2-8643-B9A3-A6905164CDF3}" type="datetimeFigureOut">
               <a:rPr lang="en-US" smtClean="0"/>
-              <a:t>11/7/2015</a:t>
+              <a:t>11/8/2015</a:t>
             </a:fld>
             <a:endParaRPr lang="en-US"/>
           </a:p>
@@ -3372,14 +3372,7 @@
                 <a:latin typeface="Courier New"/>
                 <a:cs typeface="Courier New"/>
               </a:rPr>
-              <a:t> </a:t>
-            </a:r>
-            <a:r>
-              <a:rPr lang="en-US" sz="1050" dirty="0" smtClean="0">
-                <a:latin typeface="Courier New"/>
-                <a:cs typeface="Courier New"/>
-              </a:rPr>
-              <a:t>(</a:t>
+              <a:t> (</a:t>
             </a:r>
             <a:r>
               <a:rPr lang="en-US" sz="1050" dirty="0" smtClean="0">
@@ -3629,10 +3622,6 @@
               </a:rPr>
               <a:t>batchTableByteLength</a:t>
             </a:r>
-            <a:endParaRPr lang="en-US" sz="1000" dirty="0" smtClean="0">
-              <a:latin typeface="Courier New"/>
-              <a:cs typeface="Courier New"/>
-            </a:endParaRPr>
           </a:p>
           <a:p>
             <a:pPr algn="ctr"/>
@@ -3823,10 +3812,6 @@
               </a:rPr>
               <a:t>gltfByteLength</a:t>
             </a:r>
-            <a:endParaRPr lang="en-US" sz="1000" dirty="0" smtClean="0">
-              <a:latin typeface="Courier New"/>
-              <a:cs typeface="Courier New"/>
-            </a:endParaRPr>
           </a:p>
           <a:p>
             <a:pPr algn="ctr"/>
@@ -4158,8 +4143,8 @@
         </p:nvSpPr>
         <p:spPr>
           <a:xfrm>
-            <a:off x="239625" y="4910682"/>
-            <a:ext cx="906017" cy="415498"/>
+            <a:off x="254052" y="4910682"/>
+            <a:ext cx="877163" cy="400110"/>
           </a:xfrm>
           <a:prstGeom prst="rect">
             <a:avLst/>
@@ -4215,10 +4200,6 @@
               </a:rPr>
               <a:t>)</a:t>
             </a:r>
-            <a:endParaRPr lang="en-US" sz="1000" dirty="0">
-              <a:latin typeface="Courier New"/>
-              <a:cs typeface="Courier New"/>
-            </a:endParaRPr>
           </a:p>
         </p:txBody>
       </p:sp>
@@ -4230,8 +4211,8 @@
         </p:nvCxnSpPr>
         <p:spPr>
           <a:xfrm>
-            <a:off x="217984" y="4732440"/>
-            <a:ext cx="2575160" cy="0"/>
+            <a:off x="254052" y="4732440"/>
+            <a:ext cx="2477601" cy="0"/>
           </a:xfrm>
           <a:prstGeom prst="straightConnector1">
             <a:avLst/>
@@ -4308,8 +4289,8 @@
         </p:nvSpPr>
         <p:spPr>
           <a:xfrm>
-            <a:off x="1967277" y="4910682"/>
-            <a:ext cx="825867" cy="415498"/>
+            <a:off x="1931434" y="4910682"/>
+            <a:ext cx="800219" cy="400110"/>
           </a:xfrm>
           <a:prstGeom prst="rect">
             <a:avLst/>
@@ -4356,7 +4337,7 @@
                 <a:latin typeface="Courier New"/>
                 <a:cs typeface="Courier New"/>
               </a:rPr>
-              <a:t>uint32</a:t>
+              <a:t>uint16</a:t>
             </a:r>
             <a:r>
               <a:rPr lang="en-US" sz="1000" dirty="0" smtClean="0">
@@ -4365,10 +4346,6 @@
               </a:rPr>
               <a:t>)</a:t>
             </a:r>
-            <a:endParaRPr lang="en-US" sz="1000" dirty="0">
-              <a:latin typeface="Courier New"/>
-              <a:cs typeface="Courier New"/>
-            </a:endParaRPr>
           </a:p>
         </p:txBody>
       </p:sp>
@@ -4380,8 +4357,8 @@
         </p:nvSpPr>
         <p:spPr>
           <a:xfrm>
-            <a:off x="1139738" y="4910682"/>
-            <a:ext cx="825867" cy="415498"/>
+            <a:off x="1131215" y="4910682"/>
+            <a:ext cx="800219" cy="400110"/>
           </a:xfrm>
           <a:prstGeom prst="rect">
             <a:avLst/>
@@ -4437,10 +4414,6 @@
               </a:rPr>
               <a:t>)</a:t>
             </a:r>
-            <a:endParaRPr lang="en-US" sz="1000" dirty="0">
-              <a:latin typeface="Courier New"/>
-              <a:cs typeface="Courier New"/>
-            </a:endParaRPr>
           </a:p>
         </p:txBody>
       </p:sp>

</xml_diff>